<commit_message>
added 00 - course outline.pptx
</commit_message>
<xml_diff>
--- a/C++-Code-Samples/00 - course outline.pptx
+++ b/C++-Code-Samples/00 - course outline.pptx
@@ -301,7 +301,7 @@
           <a:p>
             <a:fld id="{48A87A34-81AB-432B-8DAE-1953F412C126}" type="datetimeFigureOut">
               <a:rPr lang="en-US" smtClean="0"/>
-              <a:t>9/13/2016</a:t>
+              <a:t>9/22/2016</a:t>
             </a:fld>
             <a:endParaRPr lang="en-US" dirty="0"/>
           </a:p>
@@ -595,7 +595,7 @@
           <a:p>
             <a:fld id="{48A87A34-81AB-432B-8DAE-1953F412C126}" type="datetimeFigureOut">
               <a:rPr lang="en-US" smtClean="0"/>
-              <a:t>9/13/2016</a:t>
+              <a:t>9/22/2016</a:t>
             </a:fld>
             <a:endParaRPr lang="en-US" dirty="0"/>
           </a:p>
@@ -808,7 +808,7 @@
           <a:p>
             <a:fld id="{48A87A34-81AB-432B-8DAE-1953F412C126}" type="datetimeFigureOut">
               <a:rPr lang="en-US" smtClean="0"/>
-              <a:t>9/13/2016</a:t>
+              <a:t>9/22/2016</a:t>
             </a:fld>
             <a:endParaRPr lang="en-US" dirty="0"/>
           </a:p>
@@ -1100,7 +1100,7 @@
           <a:p>
             <a:fld id="{48A87A34-81AB-432B-8DAE-1953F412C126}" type="datetimeFigureOut">
               <a:rPr lang="en-US" smtClean="0"/>
-              <a:t>9/13/2016</a:t>
+              <a:t>9/22/2016</a:t>
             </a:fld>
             <a:endParaRPr lang="en-US" dirty="0"/>
           </a:p>
@@ -1460,7 +1460,7 @@
           <a:p>
             <a:fld id="{48A87A34-81AB-432B-8DAE-1953F412C126}" type="datetimeFigureOut">
               <a:rPr lang="en-US" smtClean="0"/>
-              <a:t>9/13/2016</a:t>
+              <a:t>9/22/2016</a:t>
             </a:fld>
             <a:endParaRPr lang="en-US" dirty="0"/>
           </a:p>
@@ -2102,7 +2102,7 @@
           <a:p>
             <a:fld id="{48A87A34-81AB-432B-8DAE-1953F412C126}" type="datetimeFigureOut">
               <a:rPr lang="en-US" smtClean="0"/>
-              <a:t>9/13/2016</a:t>
+              <a:t>9/22/2016</a:t>
             </a:fld>
             <a:endParaRPr lang="en-US" dirty="0"/>
           </a:p>
@@ -2981,7 +2981,7 @@
           <a:p>
             <a:fld id="{48A87A34-81AB-432B-8DAE-1953F412C126}" type="datetimeFigureOut">
               <a:rPr lang="en-US" smtClean="0"/>
-              <a:t>9/13/2016</a:t>
+              <a:t>9/22/2016</a:t>
             </a:fld>
             <a:endParaRPr lang="en-US" dirty="0"/>
           </a:p>
@@ -3170,7 +3170,7 @@
           <a:p>
             <a:fld id="{48A87A34-81AB-432B-8DAE-1953F412C126}" type="datetimeFigureOut">
               <a:rPr lang="en-US" smtClean="0"/>
-              <a:t>9/13/2016</a:t>
+              <a:t>9/22/2016</a:t>
             </a:fld>
             <a:endParaRPr lang="en-US" dirty="0"/>
           </a:p>
@@ -3369,7 +3369,7 @@
           <a:p>
             <a:fld id="{48A87A34-81AB-432B-8DAE-1953F412C126}" type="datetimeFigureOut">
               <a:rPr lang="en-US" smtClean="0"/>
-              <a:t>9/13/2016</a:t>
+              <a:t>9/22/2016</a:t>
             </a:fld>
             <a:endParaRPr lang="en-US" dirty="0"/>
           </a:p>
@@ -3558,7 +3558,7 @@
           <a:p>
             <a:fld id="{48A87A34-81AB-432B-8DAE-1953F412C126}" type="datetimeFigureOut">
               <a:rPr lang="en-US" smtClean="0"/>
-              <a:t>9/13/2016</a:t>
+              <a:t>9/22/2016</a:t>
             </a:fld>
             <a:endParaRPr lang="en-US" dirty="0"/>
           </a:p>
@@ -3824,7 +3824,7 @@
           <a:p>
             <a:fld id="{48A87A34-81AB-432B-8DAE-1953F412C126}" type="datetimeFigureOut">
               <a:rPr lang="en-US" smtClean="0"/>
-              <a:t>9/13/2016</a:t>
+              <a:t>9/22/2016</a:t>
             </a:fld>
             <a:endParaRPr lang="en-US" dirty="0"/>
           </a:p>
@@ -4135,7 +4135,7 @@
           <a:p>
             <a:fld id="{48A87A34-81AB-432B-8DAE-1953F412C126}" type="datetimeFigureOut">
               <a:rPr lang="en-US" smtClean="0"/>
-              <a:t>9/13/2016</a:t>
+              <a:t>9/22/2016</a:t>
             </a:fld>
             <a:endParaRPr lang="en-US" dirty="0"/>
           </a:p>
@@ -4598,7 +4598,7 @@
           <a:p>
             <a:fld id="{48A87A34-81AB-432B-8DAE-1953F412C126}" type="datetimeFigureOut">
               <a:rPr lang="en-US" smtClean="0"/>
-              <a:t>9/13/2016</a:t>
+              <a:t>9/22/2016</a:t>
             </a:fld>
             <a:endParaRPr lang="en-US" dirty="0"/>
           </a:p>
@@ -4735,7 +4735,7 @@
           <a:p>
             <a:fld id="{48A87A34-81AB-432B-8DAE-1953F412C126}" type="datetimeFigureOut">
               <a:rPr lang="en-US" smtClean="0"/>
-              <a:t>9/13/2016</a:t>
+              <a:t>9/22/2016</a:t>
             </a:fld>
             <a:endParaRPr lang="en-US" dirty="0"/>
           </a:p>
@@ -4849,7 +4849,7 @@
           <a:p>
             <a:fld id="{48A87A34-81AB-432B-8DAE-1953F412C126}" type="datetimeFigureOut">
               <a:rPr lang="en-US" smtClean="0"/>
-              <a:t>9/13/2016</a:t>
+              <a:t>9/22/2016</a:t>
             </a:fld>
             <a:endParaRPr lang="en-US" dirty="0"/>
           </a:p>
@@ -5147,7 +5147,7 @@
           <a:p>
             <a:fld id="{48A87A34-81AB-432B-8DAE-1953F412C126}" type="datetimeFigureOut">
               <a:rPr lang="en-US" smtClean="0"/>
-              <a:t>9/13/2016</a:t>
+              <a:t>9/22/2016</a:t>
             </a:fld>
             <a:endParaRPr lang="en-US" dirty="0"/>
           </a:p>
@@ -5441,7 +5441,7 @@
           <a:p>
             <a:fld id="{48A87A34-81AB-432B-8DAE-1953F412C126}" type="datetimeFigureOut">
               <a:rPr lang="en-US" smtClean="0"/>
-              <a:t>9/13/2016</a:t>
+              <a:t>9/22/2016</a:t>
             </a:fld>
             <a:endParaRPr lang="en-US" dirty="0"/>
           </a:p>
@@ -5890,7 +5890,7 @@
             <a:fld id="{48A87A34-81AB-432B-8DAE-1953F412C126}" type="datetimeFigureOut">
               <a:rPr lang="en-US" smtClean="0"/>
               <a:pPr/>
-              <a:t>9/13/2016</a:t>
+              <a:t>9/22/2016</a:t>
             </a:fld>
             <a:endParaRPr lang="en-US" dirty="0"/>
           </a:p>
@@ -6729,7 +6729,15 @@
                   <a:schemeClr val="tx1"/>
                 </a:solidFill>
               </a:rPr>
-              <a:t>Ternary if statement</a:t>
+              <a:t>If </a:t>
+            </a:r>
+            <a:r>
+              <a:rPr lang="en-US" sz="1800" cap="none" dirty="0" smtClean="0">
+                <a:solidFill>
+                  <a:schemeClr val="tx1"/>
+                </a:solidFill>
+              </a:rPr>
+              <a:t>else statement</a:t>
             </a:r>
           </a:p>
           <a:p>
@@ -6746,7 +6754,7 @@
                   <a:schemeClr val="tx1"/>
                 </a:solidFill>
               </a:rPr>
-              <a:t>If else statement</a:t>
+              <a:t>Nested if statement</a:t>
             </a:r>
           </a:p>
           <a:p>
@@ -6763,25 +6771,51 @@
                   <a:schemeClr val="tx1"/>
                 </a:solidFill>
               </a:rPr>
-              <a:t>Nested if statement</a:t>
+              <a:t>Switch </a:t>
+            </a:r>
+            <a:r>
+              <a:rPr lang="en-US" sz="1800" cap="none" dirty="0" smtClean="0">
+                <a:solidFill>
+                  <a:schemeClr val="tx1"/>
+                </a:solidFill>
+              </a:rPr>
+              <a:t>statement</a:t>
             </a:r>
           </a:p>
           <a:p>
             <a:pPr marL="342900" indent="-342900">
-              <a:lnSpc>
-                <a:spcPct val="100000"/>
-              </a:lnSpc>
               <a:buFont typeface="+mj-lt"/>
               <a:buAutoNum type="arabicPeriod"/>
             </a:pPr>
             <a:r>
-              <a:rPr lang="en-US" sz="1800" cap="none" dirty="0" smtClean="0">
+              <a:rPr lang="en-US" sz="1800" cap="none">
                 <a:solidFill>
                   <a:schemeClr val="tx1"/>
                 </a:solidFill>
               </a:rPr>
-              <a:t>Switch statement</a:t>
-            </a:r>
+              <a:t>Ternary </a:t>
+            </a:r>
+            <a:r>
+              <a:rPr lang="en-US" sz="1800" cap="none">
+                <a:solidFill>
+                  <a:schemeClr val="tx1"/>
+                </a:solidFill>
+              </a:rPr>
+              <a:t>if </a:t>
+            </a:r>
+            <a:r>
+              <a:rPr lang="en-US" sz="1800" cap="none" smtClean="0">
+                <a:solidFill>
+                  <a:schemeClr val="tx1"/>
+                </a:solidFill>
+              </a:rPr>
+              <a:t>statement</a:t>
+            </a:r>
+            <a:endParaRPr lang="en-US" sz="1800" cap="none" dirty="0" smtClean="0">
+              <a:solidFill>
+                <a:schemeClr val="tx1"/>
+              </a:solidFill>
+            </a:endParaRPr>
           </a:p>
           <a:p>
             <a:pPr marL="342900" indent="-342900">

</xml_diff>